<commit_message>
Add some contact info.
</commit_message>
<xml_diff>
--- a/Using Docker in Production.pptx
+++ b/Using Docker in Production.pptx
@@ -8151,8 +8151,8 @@
         </p:nvSpPr>
         <p:spPr>
           <a:xfrm>
-            <a:off y="3921994" x="685800"/>
-            <a:ext cy="774300" cx="7772400"/>
+            <a:off y="3541003" x="685800"/>
+            <a:ext cy="1221600" cx="7772400"/>
           </a:xfrm>
           <a:prstGeom prst="rect">
             <a:avLst/>
@@ -8201,6 +8201,55 @@
                 <a:sym typeface="Open Sans"/>
               </a:rPr>
               <a:t>CTO, Connectify</a:t>
+            </a:r>
+          </a:p>
+          <a:p>
+            <a:pPr algn="ctr" rtl="0" lvl="0">
+              <a:spcBef>
+                <a:spcPts val="0"/>
+              </a:spcBef>
+              <a:buNone/>
+            </a:pPr>
+            <a:r>
+              <a:rPr u="sng" sz="1400" lang="en">
+                <a:solidFill>
+                  <a:srgbClr val="000000"/>
+                </a:solidFill>
+                <a:hlinkClick r:id="rId3"/>
+              </a:rPr>
+              <a:t>bprodoehl@connectify.me</a:t>
+            </a:r>
+          </a:p>
+          <a:p>
+            <a:pPr algn="ctr" rtl="0" lvl="0">
+              <a:spcBef>
+                <a:spcPts val="0"/>
+              </a:spcBef>
+              <a:buNone/>
+            </a:pPr>
+            <a:r>
+              <a:rPr sz="1400" lang="en">
+                <a:solidFill>
+                  <a:srgbClr val="000000"/>
+                </a:solidFill>
+              </a:rPr>
+              <a:t>@BrianProdoehl</a:t>
+            </a:r>
+          </a:p>
+          <a:p>
+            <a:pPr algn="ctr" rtl="0" lvl="0">
+              <a:spcBef>
+                <a:spcPts val="0"/>
+              </a:spcBef>
+              <a:buNone/>
+            </a:pPr>
+            <a:r>
+              <a:rPr sz="1400" lang="en">
+                <a:solidFill>
+                  <a:srgbClr val="000000"/>
+                </a:solidFill>
+              </a:rPr>
+              <a:t>Slides at https://github.com/bprodoehl/DevOpsMeetup</a:t>
             </a:r>
           </a:p>
         </p:txBody>
@@ -14626,7 +14675,7 @@
           </a:bodyPr>
           <a:lstStyle/>
           <a:p>
-            <a:pPr algn="ctr" rtl="0" lvl="0">
+            <a:pPr algn="ctr" rtl="0">
               <a:spcBef>
                 <a:spcPts val="0"/>
               </a:spcBef>
@@ -14640,6 +14689,23 @@
                 <a:sym typeface="Varela Round"/>
               </a:rPr>
               <a:t>We're hiring!</a:t>
+            </a:r>
+          </a:p>
+          <a:p>
+            <a:pPr algn="ctr" rtl="0" lvl="0">
+              <a:spcBef>
+                <a:spcPts val="0"/>
+              </a:spcBef>
+              <a:buNone/>
+            </a:pPr>
+            <a:r>
+              <a:rPr sz="3000" lang="en">
+                <a:latin typeface="Varela Round"/>
+                <a:ea typeface="Varela Round"/>
+                <a:cs typeface="Varela Round"/>
+                <a:sym typeface="Varela Round"/>
+              </a:rPr>
+              <a:t>jobs@connectify.me</a:t>
             </a:r>
           </a:p>
         </p:txBody>
@@ -14726,8 +14792,8 @@
         </p:nvSpPr>
         <p:spPr>
           <a:xfrm>
-            <a:off y="3921994" x="685800"/>
-            <a:ext cy="774300" cx="7772400"/>
+            <a:off y="3541003" x="685800"/>
+            <a:ext cy="1221600" cx="7772400"/>
           </a:xfrm>
           <a:prstGeom prst="rect">
             <a:avLst/>
@@ -14759,7 +14825,7 @@
             </a:r>
           </a:p>
           <a:p>
-            <a:pPr algn="ctr" rtl="0" lvl="0">
+            <a:pPr algn="ctr" rtl="0">
               <a:spcBef>
                 <a:spcPts val="0"/>
               </a:spcBef>
@@ -14776,6 +14842,55 @@
                 <a:sym typeface="Open Sans"/>
               </a:rPr>
               <a:t>CTO, Connectify</a:t>
+            </a:r>
+          </a:p>
+          <a:p>
+            <a:pPr algn="ctr" rtl="0">
+              <a:spcBef>
+                <a:spcPts val="0"/>
+              </a:spcBef>
+              <a:buNone/>
+            </a:pPr>
+            <a:r>
+              <a:rPr u="sng" sz="1400" lang="en">
+                <a:solidFill>
+                  <a:srgbClr val="000000"/>
+                </a:solidFill>
+                <a:hlinkClick r:id="rId3"/>
+              </a:rPr>
+              <a:t>bprodoehl@connectify.me</a:t>
+            </a:r>
+          </a:p>
+          <a:p>
+            <a:pPr algn="ctr" rtl="0" lvl="0">
+              <a:spcBef>
+                <a:spcPts val="0"/>
+              </a:spcBef>
+              <a:buNone/>
+            </a:pPr>
+            <a:r>
+              <a:rPr sz="1400" lang="en">
+                <a:solidFill>
+                  <a:srgbClr val="000000"/>
+                </a:solidFill>
+              </a:rPr>
+              <a:t>@BrianProdoehl</a:t>
+            </a:r>
+          </a:p>
+          <a:p>
+            <a:pPr algn="ctr" rtl="0" lvl="0">
+              <a:spcBef>
+                <a:spcPts val="0"/>
+              </a:spcBef>
+              <a:buNone/>
+            </a:pPr>
+            <a:r>
+              <a:rPr sz="1400" lang="en">
+                <a:solidFill>
+                  <a:srgbClr val="000000"/>
+                </a:solidFill>
+              </a:rPr>
+              <a:t>Slides at https://github.com/bprodoehl/DevOpsMeetup</a:t>
             </a:r>
           </a:p>
         </p:txBody>
@@ -15541,283 +15656,6 @@
 </file>
 
 <file path=ppt/theme/theme2.xml><?xml version="1.0" encoding="utf-8"?>
-<a:theme xmlns:a="http://schemas.openxmlformats.org/drawingml/2006/main" xmlns:r="http://schemas.openxmlformats.org/officeDocument/2006/relationships" name="Custom Theme">
-  <a:themeElements>
-    <a:clrScheme name="Default">
-      <a:dk1>
-        <a:srgbClr val="000000"/>
-      </a:dk1>
-      <a:lt1>
-        <a:srgbClr val="FFFFFF"/>
-      </a:lt1>
-      <a:dk2>
-        <a:srgbClr val="158158"/>
-      </a:dk2>
-      <a:lt2>
-        <a:srgbClr val="F3F3F3"/>
-      </a:lt2>
-      <a:accent1>
-        <a:srgbClr val="058DC7"/>
-      </a:accent1>
-      <a:accent2>
-        <a:srgbClr val="50B432"/>
-      </a:accent2>
-      <a:accent3>
-        <a:srgbClr val="ED561B"/>
-      </a:accent3>
-      <a:accent4>
-        <a:srgbClr val="EDEF00"/>
-      </a:accent4>
-      <a:accent5>
-        <a:srgbClr val="24CBE5"/>
-      </a:accent5>
-      <a:accent6>
-        <a:srgbClr val="64E572"/>
-      </a:accent6>
-      <a:hlink>
-        <a:srgbClr val="2200CC"/>
-      </a:hlink>
-      <a:folHlink>
-        <a:srgbClr val="551A8B"/>
-      </a:folHlink>
-    </a:clrScheme>
-    <a:fontScheme name="Office">
-      <a:majorFont>
-        <a:latin typeface="Arial"/>
-        <a:ea typeface=""/>
-        <a:cs typeface=""/>
-        <a:font typeface="ＭＳ Ｐゴシック" script="Jpan"/>
-        <a:font typeface="맑은 고딕" script="Hang"/>
-        <a:font typeface="宋体" script="Hans"/>
-        <a:font typeface="新細明體" script="Hant"/>
-        <a:font typeface="Times New Roman" script="Arab"/>
-        <a:font typeface="Times New Roman" script="Hebr"/>
-        <a:font typeface="Angsana New" script="Thai"/>
-        <a:font typeface="Nyala" script="Ethi"/>
-        <a:font typeface="Vrinda" script="Beng"/>
-        <a:font typeface="Shruti" script="Gujr"/>
-        <a:font typeface="MoolBoran" script="Khmr"/>
-        <a:font typeface="Tunga" script="Knda"/>
-        <a:font typeface="Raavi" script="Guru"/>
-        <a:font typeface="Euphemia" script="Cans"/>
-        <a:font typeface="Plantagenet Cherokee" script="Cher"/>
-        <a:font typeface="Microsoft Yi Baiti" script="Yiii"/>
-        <a:font typeface="Microsoft Himalaya" script="Tibt"/>
-        <a:font typeface="MV Boli" script="Thaa"/>
-        <a:font typeface="Mangal" script="Deva"/>
-        <a:font typeface="Gautami" script="Telu"/>
-        <a:font typeface="Latha" script="Taml"/>
-        <a:font typeface="Estrangelo Edessa" script="Syrc"/>
-        <a:font typeface="Kalinga" script="Orya"/>
-        <a:font typeface="Kartika" script="Mlym"/>
-        <a:font typeface="DokChampa" script="Laoo"/>
-        <a:font typeface="Iskoola Pota" script="Sinh"/>
-        <a:font typeface="Mongolian Baiti" script="Mong"/>
-        <a:font typeface="Times New Roman" script="Viet"/>
-        <a:font typeface="Microsoft Uighur" script="Uigh"/>
-      </a:majorFont>
-      <a:minorFont>
-        <a:latin typeface="Arial"/>
-        <a:ea typeface=""/>
-        <a:cs typeface=""/>
-        <a:font typeface="ＭＳ Ｐゴシック" script="Jpan"/>
-        <a:font typeface="맑은 고딕" script="Hang"/>
-        <a:font typeface="宋体" script="Hans"/>
-        <a:font typeface="新細明體" script="Hant"/>
-        <a:font typeface="Times New Roman" script="Arab"/>
-        <a:font typeface="Times New Roman" script="Hebr"/>
-        <a:font typeface="Angsana New" script="Thai"/>
-        <a:font typeface="Nyala" script="Ethi"/>
-        <a:font typeface="Vrinda" script="Beng"/>
-        <a:font typeface="Shruti" script="Gujr"/>
-        <a:font typeface="MoolBoran" script="Khmr"/>
-        <a:font typeface="Tunga" script="Knda"/>
-        <a:font typeface="Raavi" script="Guru"/>
-        <a:font typeface="Euphemia" script="Cans"/>
-        <a:font typeface="Plantagenet Cherokee" script="Cher"/>
-        <a:font typeface="Microsoft Yi Baiti" script="Yiii"/>
-        <a:font typeface="Microsoft Himalaya" script="Tibt"/>
-        <a:font typeface="MV Boli" script="Thaa"/>
-        <a:font typeface="Mangal" script="Deva"/>
-        <a:font typeface="Gautami" script="Telu"/>
-        <a:font typeface="Latha" script="Taml"/>
-        <a:font typeface="Estrangelo Edessa" script="Syrc"/>
-        <a:font typeface="Kalinga" script="Orya"/>
-        <a:font typeface="Kartika" script="Mlym"/>
-        <a:font typeface="DokChampa" script="Laoo"/>
-        <a:font typeface="Iskoola Pota" script="Sinh"/>
-        <a:font typeface="Mongolian Baiti" script="Mong"/>
-        <a:font typeface="Times New Roman" script="Viet"/>
-        <a:font typeface="Microsoft Uighur" script="Uigh"/>
-      </a:minorFont>
-    </a:fontScheme>
-    <a:fmtScheme name="Office">
-      <a:fillStyleLst>
-        <a:solidFill>
-          <a:schemeClr val="phClr"/>
-        </a:solidFill>
-        <a:gradFill rotWithShape="1">
-          <a:gsLst>
-            <a:gs pos="0">
-              <a:schemeClr val="phClr">
-                <a:tint val="50000"/>
-                <a:satMod val="300000"/>
-              </a:schemeClr>
-            </a:gs>
-            <a:gs pos="35000">
-              <a:schemeClr val="phClr">
-                <a:tint val="37000"/>
-                <a:satMod val="300000"/>
-              </a:schemeClr>
-            </a:gs>
-            <a:gs pos="100000">
-              <a:schemeClr val="phClr">
-                <a:tint val="15000"/>
-                <a:satMod val="350000"/>
-              </a:schemeClr>
-            </a:gs>
-          </a:gsLst>
-          <a:lin ang="16200000" scaled="1"/>
-        </a:gradFill>
-        <a:gradFill rotWithShape="1">
-          <a:gsLst>
-            <a:gs pos="0">
-              <a:schemeClr val="phClr">
-                <a:tint val="100000"/>
-                <a:shade val="100000"/>
-                <a:satMod val="130000"/>
-              </a:schemeClr>
-            </a:gs>
-            <a:gs pos="100000">
-              <a:schemeClr val="phClr">
-                <a:tint val="50000"/>
-                <a:shade val="100000"/>
-                <a:satMod val="350000"/>
-              </a:schemeClr>
-            </a:gs>
-          </a:gsLst>
-          <a:lin ang="16200000" scaled="0"/>
-        </a:gradFill>
-      </a:fillStyleLst>
-      <a:lnStyleLst>
-        <a:ln w="9525" algn="ctr" cap="flat" cmpd="sng">
-          <a:solidFill>
-            <a:schemeClr val="phClr">
-              <a:shade val="95000"/>
-              <a:satMod val="105000"/>
-            </a:schemeClr>
-          </a:solidFill>
-          <a:prstDash val="solid"/>
-        </a:ln>
-        <a:ln w="25400" algn="ctr" cap="flat" cmpd="sng">
-          <a:solidFill>
-            <a:schemeClr val="phClr"/>
-          </a:solidFill>
-          <a:prstDash val="solid"/>
-        </a:ln>
-        <a:ln w="38100" algn="ctr" cap="flat" cmpd="sng">
-          <a:solidFill>
-            <a:schemeClr val="phClr"/>
-          </a:solidFill>
-          <a:prstDash val="solid"/>
-        </a:ln>
-      </a:lnStyleLst>
-      <a:effectStyleLst>
-        <a:effectStyle>
-          <a:effectLst>
-            <a:outerShdw rotWithShape="0" dir="5400000" blurRad="40000" dist="20000">
-              <a:srgbClr val="000000">
-                <a:alpha val="38000"/>
-              </a:srgbClr>
-            </a:outerShdw>
-          </a:effectLst>
-        </a:effectStyle>
-        <a:effectStyle>
-          <a:effectLst>
-            <a:outerShdw rotWithShape="0" dir="5400000" blurRad="40000" dist="23000">
-              <a:srgbClr val="000000">
-                <a:alpha val="35000"/>
-              </a:srgbClr>
-            </a:outerShdw>
-          </a:effectLst>
-        </a:effectStyle>
-        <a:effectStyle>
-          <a:effectLst>
-            <a:outerShdw rotWithShape="0" dir="5400000" blurRad="40000" dist="23000">
-              <a:srgbClr val="000000">
-                <a:alpha val="35000"/>
-              </a:srgbClr>
-            </a:outerShdw>
-          </a:effectLst>
-          <a:scene3d>
-            <a:camera prst="orthographicFront">
-              <a:rot rev="0" lon="0" lat="0"/>
-            </a:camera>
-            <a:lightRig dir="t" rig="threePt">
-              <a:rot rev="1200000" lon="0" lat="0"/>
-            </a:lightRig>
-          </a:scene3d>
-          <a:sp3d>
-            <a:bevelT w="63500" h="25400"/>
-          </a:sp3d>
-        </a:effectStyle>
-      </a:effectStyleLst>
-      <a:bgFillStyleLst>
-        <a:solidFill>
-          <a:schemeClr val="phClr"/>
-        </a:solidFill>
-        <a:gradFill rotWithShape="1">
-          <a:gsLst>
-            <a:gs pos="0">
-              <a:schemeClr val="phClr">
-                <a:tint val="40000"/>
-                <a:satMod val="350000"/>
-              </a:schemeClr>
-            </a:gs>
-            <a:gs pos="40000">
-              <a:schemeClr val="phClr">
-                <a:tint val="45000"/>
-                <a:shade val="99000"/>
-                <a:satMod val="350000"/>
-              </a:schemeClr>
-            </a:gs>
-            <a:gs pos="100000">
-              <a:schemeClr val="phClr">
-                <a:shade val="20000"/>
-                <a:satMod val="255000"/>
-              </a:schemeClr>
-            </a:gs>
-          </a:gsLst>
-          <a:path path="circle">
-            <a:fillToRect t="-80000" b="180000" r="50000" l="50000"/>
-          </a:path>
-        </a:gradFill>
-        <a:gradFill rotWithShape="1">
-          <a:gsLst>
-            <a:gs pos="0">
-              <a:schemeClr val="phClr">
-                <a:tint val="80000"/>
-                <a:satMod val="300000"/>
-              </a:schemeClr>
-            </a:gs>
-            <a:gs pos="100000">
-              <a:schemeClr val="phClr">
-                <a:shade val="30000"/>
-                <a:satMod val="200000"/>
-              </a:schemeClr>
-            </a:gs>
-          </a:gsLst>
-          <a:path path="circle">
-            <a:fillToRect t="50000" b="50000" r="50000" l="50000"/>
-          </a:path>
-        </a:gradFill>
-      </a:bgFillStyleLst>
-    </a:fmtScheme>
-  </a:themeElements>
-</a:theme>
-</file>
-
-<file path=ppt/theme/theme3.xml><?xml version="1.0" encoding="utf-8"?>
 <a:theme xmlns:a="http://schemas.openxmlformats.org/drawingml/2006/main" xmlns:r="http://schemas.openxmlformats.org/officeDocument/2006/relationships" name="Office Theme">
   <a:themeElements>
     <a:clrScheme name="Office">
@@ -16132,4 +15970,281 @@
     </a:lnDef>
   </a:objectDefaults>
 </a:theme>
+</file>
+
+<file path=ppt/theme/theme3.xml><?xml version="1.0" encoding="utf-8"?>
+<a:theme xmlns:a="http://schemas.openxmlformats.org/drawingml/2006/main" xmlns:r="http://schemas.openxmlformats.org/officeDocument/2006/relationships" name="Custom Theme">
+  <a:themeElements>
+    <a:clrScheme name="Default">
+      <a:dk1>
+        <a:srgbClr val="000000"/>
+      </a:dk1>
+      <a:lt1>
+        <a:srgbClr val="FFFFFF"/>
+      </a:lt1>
+      <a:dk2>
+        <a:srgbClr val="158158"/>
+      </a:dk2>
+      <a:lt2>
+        <a:srgbClr val="F3F3F3"/>
+      </a:lt2>
+      <a:accent1>
+        <a:srgbClr val="058DC7"/>
+      </a:accent1>
+      <a:accent2>
+        <a:srgbClr val="50B432"/>
+      </a:accent2>
+      <a:accent3>
+        <a:srgbClr val="ED561B"/>
+      </a:accent3>
+      <a:accent4>
+        <a:srgbClr val="EDEF00"/>
+      </a:accent4>
+      <a:accent5>
+        <a:srgbClr val="24CBE5"/>
+      </a:accent5>
+      <a:accent6>
+        <a:srgbClr val="64E572"/>
+      </a:accent6>
+      <a:hlink>
+        <a:srgbClr val="2200CC"/>
+      </a:hlink>
+      <a:folHlink>
+        <a:srgbClr val="551A8B"/>
+      </a:folHlink>
+    </a:clrScheme>
+    <a:fontScheme name="Office">
+      <a:majorFont>
+        <a:latin typeface="Arial"/>
+        <a:ea typeface=""/>
+        <a:cs typeface=""/>
+        <a:font typeface="ＭＳ Ｐゴシック" script="Jpan"/>
+        <a:font typeface="맑은 고딕" script="Hang"/>
+        <a:font typeface="宋体" script="Hans"/>
+        <a:font typeface="新細明體" script="Hant"/>
+        <a:font typeface="Times New Roman" script="Arab"/>
+        <a:font typeface="Times New Roman" script="Hebr"/>
+        <a:font typeface="Angsana New" script="Thai"/>
+        <a:font typeface="Nyala" script="Ethi"/>
+        <a:font typeface="Vrinda" script="Beng"/>
+        <a:font typeface="Shruti" script="Gujr"/>
+        <a:font typeface="MoolBoran" script="Khmr"/>
+        <a:font typeface="Tunga" script="Knda"/>
+        <a:font typeface="Raavi" script="Guru"/>
+        <a:font typeface="Euphemia" script="Cans"/>
+        <a:font typeface="Plantagenet Cherokee" script="Cher"/>
+        <a:font typeface="Microsoft Yi Baiti" script="Yiii"/>
+        <a:font typeface="Microsoft Himalaya" script="Tibt"/>
+        <a:font typeface="MV Boli" script="Thaa"/>
+        <a:font typeface="Mangal" script="Deva"/>
+        <a:font typeface="Gautami" script="Telu"/>
+        <a:font typeface="Latha" script="Taml"/>
+        <a:font typeface="Estrangelo Edessa" script="Syrc"/>
+        <a:font typeface="Kalinga" script="Orya"/>
+        <a:font typeface="Kartika" script="Mlym"/>
+        <a:font typeface="DokChampa" script="Laoo"/>
+        <a:font typeface="Iskoola Pota" script="Sinh"/>
+        <a:font typeface="Mongolian Baiti" script="Mong"/>
+        <a:font typeface="Times New Roman" script="Viet"/>
+        <a:font typeface="Microsoft Uighur" script="Uigh"/>
+      </a:majorFont>
+      <a:minorFont>
+        <a:latin typeface="Arial"/>
+        <a:ea typeface=""/>
+        <a:cs typeface=""/>
+        <a:font typeface="ＭＳ Ｐゴシック" script="Jpan"/>
+        <a:font typeface="맑은 고딕" script="Hang"/>
+        <a:font typeface="宋体" script="Hans"/>
+        <a:font typeface="新細明體" script="Hant"/>
+        <a:font typeface="Times New Roman" script="Arab"/>
+        <a:font typeface="Times New Roman" script="Hebr"/>
+        <a:font typeface="Angsana New" script="Thai"/>
+        <a:font typeface="Nyala" script="Ethi"/>
+        <a:font typeface="Vrinda" script="Beng"/>
+        <a:font typeface="Shruti" script="Gujr"/>
+        <a:font typeface="MoolBoran" script="Khmr"/>
+        <a:font typeface="Tunga" script="Knda"/>
+        <a:font typeface="Raavi" script="Guru"/>
+        <a:font typeface="Euphemia" script="Cans"/>
+        <a:font typeface="Plantagenet Cherokee" script="Cher"/>
+        <a:font typeface="Microsoft Yi Baiti" script="Yiii"/>
+        <a:font typeface="Microsoft Himalaya" script="Tibt"/>
+        <a:font typeface="MV Boli" script="Thaa"/>
+        <a:font typeface="Mangal" script="Deva"/>
+        <a:font typeface="Gautami" script="Telu"/>
+        <a:font typeface="Latha" script="Taml"/>
+        <a:font typeface="Estrangelo Edessa" script="Syrc"/>
+        <a:font typeface="Kalinga" script="Orya"/>
+        <a:font typeface="Kartika" script="Mlym"/>
+        <a:font typeface="DokChampa" script="Laoo"/>
+        <a:font typeface="Iskoola Pota" script="Sinh"/>
+        <a:font typeface="Mongolian Baiti" script="Mong"/>
+        <a:font typeface="Times New Roman" script="Viet"/>
+        <a:font typeface="Microsoft Uighur" script="Uigh"/>
+      </a:minorFont>
+    </a:fontScheme>
+    <a:fmtScheme name="Office">
+      <a:fillStyleLst>
+        <a:solidFill>
+          <a:schemeClr val="phClr"/>
+        </a:solidFill>
+        <a:gradFill rotWithShape="1">
+          <a:gsLst>
+            <a:gs pos="0">
+              <a:schemeClr val="phClr">
+                <a:tint val="50000"/>
+                <a:satMod val="300000"/>
+              </a:schemeClr>
+            </a:gs>
+            <a:gs pos="35000">
+              <a:schemeClr val="phClr">
+                <a:tint val="37000"/>
+                <a:satMod val="300000"/>
+              </a:schemeClr>
+            </a:gs>
+            <a:gs pos="100000">
+              <a:schemeClr val="phClr">
+                <a:tint val="15000"/>
+                <a:satMod val="350000"/>
+              </a:schemeClr>
+            </a:gs>
+          </a:gsLst>
+          <a:lin ang="16200000" scaled="1"/>
+        </a:gradFill>
+        <a:gradFill rotWithShape="1">
+          <a:gsLst>
+            <a:gs pos="0">
+              <a:schemeClr val="phClr">
+                <a:tint val="100000"/>
+                <a:shade val="100000"/>
+                <a:satMod val="130000"/>
+              </a:schemeClr>
+            </a:gs>
+            <a:gs pos="100000">
+              <a:schemeClr val="phClr">
+                <a:tint val="50000"/>
+                <a:shade val="100000"/>
+                <a:satMod val="350000"/>
+              </a:schemeClr>
+            </a:gs>
+          </a:gsLst>
+          <a:lin ang="16200000" scaled="0"/>
+        </a:gradFill>
+      </a:fillStyleLst>
+      <a:lnStyleLst>
+        <a:ln w="9525" algn="ctr" cap="flat" cmpd="sng">
+          <a:solidFill>
+            <a:schemeClr val="phClr">
+              <a:shade val="95000"/>
+              <a:satMod val="105000"/>
+            </a:schemeClr>
+          </a:solidFill>
+          <a:prstDash val="solid"/>
+        </a:ln>
+        <a:ln w="25400" algn="ctr" cap="flat" cmpd="sng">
+          <a:solidFill>
+            <a:schemeClr val="phClr"/>
+          </a:solidFill>
+          <a:prstDash val="solid"/>
+        </a:ln>
+        <a:ln w="38100" algn="ctr" cap="flat" cmpd="sng">
+          <a:solidFill>
+            <a:schemeClr val="phClr"/>
+          </a:solidFill>
+          <a:prstDash val="solid"/>
+        </a:ln>
+      </a:lnStyleLst>
+      <a:effectStyleLst>
+        <a:effectStyle>
+          <a:effectLst>
+            <a:outerShdw rotWithShape="0" dir="5400000" blurRad="40000" dist="20000">
+              <a:srgbClr val="000000">
+                <a:alpha val="38000"/>
+              </a:srgbClr>
+            </a:outerShdw>
+          </a:effectLst>
+        </a:effectStyle>
+        <a:effectStyle>
+          <a:effectLst>
+            <a:outerShdw rotWithShape="0" dir="5400000" blurRad="40000" dist="23000">
+              <a:srgbClr val="000000">
+                <a:alpha val="35000"/>
+              </a:srgbClr>
+            </a:outerShdw>
+          </a:effectLst>
+        </a:effectStyle>
+        <a:effectStyle>
+          <a:effectLst>
+            <a:outerShdw rotWithShape="0" dir="5400000" blurRad="40000" dist="23000">
+              <a:srgbClr val="000000">
+                <a:alpha val="35000"/>
+              </a:srgbClr>
+            </a:outerShdw>
+          </a:effectLst>
+          <a:scene3d>
+            <a:camera prst="orthographicFront">
+              <a:rot rev="0" lon="0" lat="0"/>
+            </a:camera>
+            <a:lightRig dir="t" rig="threePt">
+              <a:rot rev="1200000" lon="0" lat="0"/>
+            </a:lightRig>
+          </a:scene3d>
+          <a:sp3d>
+            <a:bevelT w="63500" h="25400"/>
+          </a:sp3d>
+        </a:effectStyle>
+      </a:effectStyleLst>
+      <a:bgFillStyleLst>
+        <a:solidFill>
+          <a:schemeClr val="phClr"/>
+        </a:solidFill>
+        <a:gradFill rotWithShape="1">
+          <a:gsLst>
+            <a:gs pos="0">
+              <a:schemeClr val="phClr">
+                <a:tint val="40000"/>
+                <a:satMod val="350000"/>
+              </a:schemeClr>
+            </a:gs>
+            <a:gs pos="40000">
+              <a:schemeClr val="phClr">
+                <a:tint val="45000"/>
+                <a:shade val="99000"/>
+                <a:satMod val="350000"/>
+              </a:schemeClr>
+            </a:gs>
+            <a:gs pos="100000">
+              <a:schemeClr val="phClr">
+                <a:shade val="20000"/>
+                <a:satMod val="255000"/>
+              </a:schemeClr>
+            </a:gs>
+          </a:gsLst>
+          <a:path path="circle">
+            <a:fillToRect t="-80000" b="180000" r="50000" l="50000"/>
+          </a:path>
+        </a:gradFill>
+        <a:gradFill rotWithShape="1">
+          <a:gsLst>
+            <a:gs pos="0">
+              <a:schemeClr val="phClr">
+                <a:tint val="80000"/>
+                <a:satMod val="300000"/>
+              </a:schemeClr>
+            </a:gs>
+            <a:gs pos="100000">
+              <a:schemeClr val="phClr">
+                <a:shade val="30000"/>
+                <a:satMod val="200000"/>
+              </a:schemeClr>
+            </a:gs>
+          </a:gsLst>
+          <a:path path="circle">
+            <a:fillToRect t="50000" b="50000" r="50000" l="50000"/>
+          </a:path>
+        </a:gradFill>
+      </a:bgFillStyleLst>
+    </a:fmtScheme>
+  </a:themeElements>
+</a:theme>
 </file>
</xml_diff>